<commit_message>
tweaks to main doc
</commit_message>
<xml_diff>
--- a/analyses/figures/muplot_extras/muplots.pptx
+++ b/analyses/figures/muplot_extras/muplots.pptx
@@ -260,7 +260,7 @@
           <a:p>
             <a:fld id="{5363D4BD-2C2C-9F4E-9BF8-BF1C94B605A8}" type="datetimeFigureOut">
               <a:rPr lang="en-US" smtClean="0"/>
-              <a:t>5/6/21</a:t>
+              <a:t>5/7/21</a:t>
             </a:fld>
             <a:endParaRPr lang="en-US"/>
           </a:p>
@@ -458,7 +458,7 @@
           <a:p>
             <a:fld id="{5363D4BD-2C2C-9F4E-9BF8-BF1C94B605A8}" type="datetimeFigureOut">
               <a:rPr lang="en-US" smtClean="0"/>
-              <a:t>5/6/21</a:t>
+              <a:t>5/7/21</a:t>
             </a:fld>
             <a:endParaRPr lang="en-US"/>
           </a:p>
@@ -666,7 +666,7 @@
           <a:p>
             <a:fld id="{5363D4BD-2C2C-9F4E-9BF8-BF1C94B605A8}" type="datetimeFigureOut">
               <a:rPr lang="en-US" smtClean="0"/>
-              <a:t>5/6/21</a:t>
+              <a:t>5/7/21</a:t>
             </a:fld>
             <a:endParaRPr lang="en-US"/>
           </a:p>
@@ -864,7 +864,7 @@
           <a:p>
             <a:fld id="{5363D4BD-2C2C-9F4E-9BF8-BF1C94B605A8}" type="datetimeFigureOut">
               <a:rPr lang="en-US" smtClean="0"/>
-              <a:t>5/6/21</a:t>
+              <a:t>5/7/21</a:t>
             </a:fld>
             <a:endParaRPr lang="en-US"/>
           </a:p>
@@ -1139,7 +1139,7 @@
           <a:p>
             <a:fld id="{5363D4BD-2C2C-9F4E-9BF8-BF1C94B605A8}" type="datetimeFigureOut">
               <a:rPr lang="en-US" smtClean="0"/>
-              <a:t>5/6/21</a:t>
+              <a:t>5/7/21</a:t>
             </a:fld>
             <a:endParaRPr lang="en-US"/>
           </a:p>
@@ -1404,7 +1404,7 @@
           <a:p>
             <a:fld id="{5363D4BD-2C2C-9F4E-9BF8-BF1C94B605A8}" type="datetimeFigureOut">
               <a:rPr lang="en-US" smtClean="0"/>
-              <a:t>5/6/21</a:t>
+              <a:t>5/7/21</a:t>
             </a:fld>
             <a:endParaRPr lang="en-US"/>
           </a:p>
@@ -1816,7 +1816,7 @@
           <a:p>
             <a:fld id="{5363D4BD-2C2C-9F4E-9BF8-BF1C94B605A8}" type="datetimeFigureOut">
               <a:rPr lang="en-US" smtClean="0"/>
-              <a:t>5/6/21</a:t>
+              <a:t>5/7/21</a:t>
             </a:fld>
             <a:endParaRPr lang="en-US"/>
           </a:p>
@@ -1957,7 +1957,7 @@
           <a:p>
             <a:fld id="{5363D4BD-2C2C-9F4E-9BF8-BF1C94B605A8}" type="datetimeFigureOut">
               <a:rPr lang="en-US" smtClean="0"/>
-              <a:t>5/6/21</a:t>
+              <a:t>5/7/21</a:t>
             </a:fld>
             <a:endParaRPr lang="en-US"/>
           </a:p>
@@ -2070,7 +2070,7 @@
           <a:p>
             <a:fld id="{5363D4BD-2C2C-9F4E-9BF8-BF1C94B605A8}" type="datetimeFigureOut">
               <a:rPr lang="en-US" smtClean="0"/>
-              <a:t>5/6/21</a:t>
+              <a:t>5/7/21</a:t>
             </a:fld>
             <a:endParaRPr lang="en-US"/>
           </a:p>
@@ -2381,7 +2381,7 @@
           <a:p>
             <a:fld id="{5363D4BD-2C2C-9F4E-9BF8-BF1C94B605A8}" type="datetimeFigureOut">
               <a:rPr lang="en-US" smtClean="0"/>
-              <a:t>5/6/21</a:t>
+              <a:t>5/7/21</a:t>
             </a:fld>
             <a:endParaRPr lang="en-US"/>
           </a:p>
@@ -2669,7 +2669,7 @@
           <a:p>
             <a:fld id="{5363D4BD-2C2C-9F4E-9BF8-BF1C94B605A8}" type="datetimeFigureOut">
               <a:rPr lang="en-US" smtClean="0"/>
-              <a:t>5/6/21</a:t>
+              <a:t>5/7/21</a:t>
             </a:fld>
             <a:endParaRPr lang="en-US"/>
           </a:p>
@@ -2910,7 +2910,7 @@
           <a:p>
             <a:fld id="{5363D4BD-2C2C-9F4E-9BF8-BF1C94B605A8}" type="datetimeFigureOut">
               <a:rPr lang="en-US" smtClean="0"/>
-              <a:t>5/6/21</a:t>
+              <a:t>5/7/21</a:t>
             </a:fld>
             <a:endParaRPr lang="en-US"/>
           </a:p>
@@ -3406,7 +3406,7 @@
         </p:blipFill>
         <p:spPr>
           <a:xfrm>
-            <a:off x="3831617" y="485774"/>
+            <a:off x="7594121" y="502392"/>
             <a:ext cx="4528766" cy="2943226"/>
           </a:xfrm>
           <a:prstGeom prst="rect">
@@ -3435,7 +3435,7 @@
         </p:blipFill>
         <p:spPr>
           <a:xfrm>
-            <a:off x="7763754" y="501132"/>
+            <a:off x="3916433" y="481805"/>
             <a:ext cx="4359134" cy="2943227"/>
           </a:xfrm>
           <a:prstGeom prst="rect">
@@ -3521,7 +3521,7 @@
         </p:nvSpPr>
         <p:spPr>
           <a:xfrm>
-            <a:off x="8655502" y="112473"/>
+            <a:off x="4757320" y="126882"/>
             <a:ext cx="2648995" cy="369332"/>
           </a:xfrm>
           <a:prstGeom prst="rect">
@@ -3537,7 +3537,7 @@
           <a:p>
             <a:r>
               <a:rPr lang="en-US" dirty="0"/>
-              <a:t>c) Provenance Simulations</a:t>
+              <a:t>b) Provenance Simulations</a:t>
             </a:r>
           </a:p>
         </p:txBody>
@@ -3556,8 +3556,8 @@
         </p:nvSpPr>
         <p:spPr>
           <a:xfrm>
-            <a:off x="4726368" y="113923"/>
-            <a:ext cx="2804742" cy="369332"/>
+            <a:off x="8523799" y="126882"/>
+            <a:ext cx="2780698" cy="369332"/>
           </a:xfrm>
           <a:prstGeom prst="rect">
             <a:avLst/>
@@ -3572,7 +3572,15 @@
           <a:p>
             <a:r>
               <a:rPr lang="en-US" dirty="0"/>
-              <a:t>b) Microclimate Simulations</a:t>
+              <a:t>c</a:t>
+            </a:r>
+            <a:r>
+              <a:rPr lang="en-US"/>
+              <a:t>) </a:t>
+            </a:r>
+            <a:r>
+              <a:rPr lang="en-US" dirty="0"/>
+              <a:t>Microclimate Simulations</a:t>
             </a:r>
           </a:p>
         </p:txBody>

</xml_diff>